<commit_message>
Final ver pre cleanup
</commit_message>
<xml_diff>
--- a/Shear Viscosity of Colloidal Suspensions.pptx
+++ b/Shear Viscosity of Colloidal Suspensions.pptx
@@ -2181,7 +2181,7 @@
           <a:lstStyle/>
           <a:p>
             <a:pPr>
-              <a:defRPr sz="1800" b="1" i="0" u="none" strike="noStrike" kern="1200" spc="0" baseline="0">
+              <a:defRPr sz="1440" b="1" i="0" u="none" strike="noStrike" kern="1200" spc="0" baseline="0">
                 <a:solidFill>
                   <a:schemeClr val="tx1">
                     <a:lumMod val="65000"/>
@@ -2194,17 +2194,13 @@
               </a:defRPr>
             </a:pPr>
             <a:r>
-              <a:rPr lang="en-US" sz="1800" b="1"/>
-              <a:t>Norm Viscosity against Fill</a:t>
+              <a:rPr lang="en-US"/>
+              <a:t>Norm Viscosity against Fill Fraction</a:t>
             </a:r>
-            <a:r>
-              <a:rPr lang="en-US" sz="1800" b="1" baseline="0"/>
-              <a:t> Fraction</a:t>
-            </a:r>
-            <a:endParaRPr lang="en-US" sz="1800" b="1"/>
           </a:p>
         </c:rich>
       </c:tx>
+      <c:layout/>
       <c:overlay val="0"/>
       <c:spPr>
         <a:noFill/>
@@ -2218,7 +2214,7 @@
         <a:lstStyle/>
         <a:p>
           <a:pPr>
-            <a:defRPr sz="1800" b="1" i="0" u="none" strike="noStrike" kern="1200" spc="0" baseline="0">
+            <a:defRPr sz="1440" b="1" i="0" u="none" strike="noStrike" kern="1200" spc="0" baseline="0">
               <a:solidFill>
                 <a:schemeClr val="tx1">
                   <a:lumMod val="65000"/>
@@ -2245,7 +2241,7 @@
           <c:order val="0"/>
           <c:tx>
             <c:strRef>
-              <c:f>'Particles RmWat'!$M$1</c:f>
+              <c:f>'Particles RmWat PartSize'!$M$1</c:f>
               <c:strCache>
                 <c:ptCount val="1"/>
                 <c:pt idx="0">
@@ -2292,8 +2288,8 @@
             <c:trendlineLbl>
               <c:layout>
                 <c:manualLayout>
-                  <c:x val="-0.1578172112543903"/>
-                  <c:y val="-0.15828878381775904"/>
+                  <c:x val="-9.4009526478005048E-2"/>
+                  <c:y val="-4.7917031204432782E-2"/>
                 </c:manualLayout>
               </c:layout>
               <c:numFmt formatCode="General" sourceLinked="0"/>
@@ -2333,84 +2329,84 @@
             <c:noEndCap val="0"/>
             <c:plus>
               <c:numRef>
-                <c:f>'Particles RmWat'!$O$2:$O$35</c:f>
+                <c:f>'Particles RmWat PartSize'!$O$2:$O$35</c:f>
                 <c:numCache>
                   <c:formatCode>General</c:formatCode>
                   <c:ptCount val="34"/>
                   <c:pt idx="0">
-                    <c:v>1.2363104446316418E-2</c:v>
+                    <c:v>1.8433443295947795E-2</c:v>
                   </c:pt>
                   <c:pt idx="1">
-                    <c:v>0.17746041722012768</c:v>
+                    <c:v>2.6379637575899124E-2</c:v>
                   </c:pt>
                   <c:pt idx="2">
-                    <c:v>0.33289187550792404</c:v>
+                    <c:v>7.363703690560075E-2</c:v>
                   </c:pt>
                   <c:pt idx="3">
-                    <c:v>1.9581076837342344</c:v>
+                    <c:v>0.51850990596929269</c:v>
                   </c:pt>
                   <c:pt idx="4">
-                    <c:v>0.5676684152607071</c:v>
+                    <c:v>0.21565453045726077</c:v>
                   </c:pt>
                   <c:pt idx="5">
-                    <c:v>1.3210430355378584</c:v>
+                    <c:v>1.720501115421688</c:v>
                   </c:pt>
                   <c:pt idx="6">
-                    <c:v>2.3222215788279272</c:v>
+                    <c:v>1.2851809381371342</c:v>
                   </c:pt>
                   <c:pt idx="7">
-                    <c:v>3.3322207005088007</c:v>
+                    <c:v>2.3060468185777867</c:v>
                   </c:pt>
                   <c:pt idx="8">
-                    <c:v>5.8587407875674655</c:v>
+                    <c:v>4.04674163930021</c:v>
                   </c:pt>
                   <c:pt idx="9">
-                    <c:v>19.144139467378661</c:v>
+                    <c:v>5.6476450330974126</c:v>
                   </c:pt>
                   <c:pt idx="10">
-                    <c:v>16.459797324933401</c:v>
+                    <c:v>9.2874762005175882</c:v>
                   </c:pt>
                   <c:pt idx="11">
-                    <c:v>20.136876850682679</c:v>
+                    <c:v>6.8734025366196665</c:v>
                   </c:pt>
                   <c:pt idx="12">
-                    <c:v>55.846069899647283</c:v>
+                    <c:v>10.978000085970496</c:v>
                   </c:pt>
                   <c:pt idx="13">
-                    <c:v>31.778512699215725</c:v>
+                    <c:v>9.8705491803496361</c:v>
                   </c:pt>
                   <c:pt idx="14">
-                    <c:v>22.061646901200081</c:v>
+                    <c:v>8.2502678942779486</c:v>
                   </c:pt>
                   <c:pt idx="15">
-                    <c:v>55.481725840258754</c:v>
+                    <c:v>15.980150350482631</c:v>
                   </c:pt>
                   <c:pt idx="16">
-                    <c:v>37.778037707911508</c:v>
+                    <c:v>7.1893605399034994</c:v>
                   </c:pt>
                   <c:pt idx="17">
-                    <c:v>43.991960037979766</c:v>
+                    <c:v>34.143796075485824</c:v>
                   </c:pt>
                   <c:pt idx="18">
-                    <c:v>96.028657635755508</c:v>
+                    <c:v>20.862356651634709</c:v>
                   </c:pt>
                   <c:pt idx="19">
-                    <c:v>67.11794410194824</c:v>
+                    <c:v>13.720370112301307</c:v>
                   </c:pt>
                   <c:pt idx="20">
-                    <c:v>0</c:v>
+                    <c:v>28.604827599419476</c:v>
                   </c:pt>
                   <c:pt idx="21">
-                    <c:v>0</c:v>
+                    <c:v>38.076598228091079</c:v>
                   </c:pt>
                   <c:pt idx="22">
-                    <c:v>0</c:v>
+                    <c:v>43.044511830176766</c:v>
                   </c:pt>
                   <c:pt idx="23">
-                    <c:v>0</c:v>
+                    <c:v>116.90130580113035</c:v>
                   </c:pt>
                   <c:pt idx="24">
-                    <c:v>0</c:v>
+                    <c:v>68.745835729073562</c:v>
                   </c:pt>
                   <c:pt idx="25">
                     <c:v>0</c:v>
@@ -2444,84 +2440,84 @@
             </c:plus>
             <c:minus>
               <c:numRef>
-                <c:f>'Particles RmWat'!$O$2:$O$35</c:f>
+                <c:f>'Particles RmWat PartSize'!$O$2:$O$35</c:f>
                 <c:numCache>
                   <c:formatCode>General</c:formatCode>
                   <c:ptCount val="34"/>
                   <c:pt idx="0">
-                    <c:v>1.2363104446316418E-2</c:v>
+                    <c:v>1.8433443295947795E-2</c:v>
                   </c:pt>
                   <c:pt idx="1">
-                    <c:v>0.17746041722012768</c:v>
+                    <c:v>2.6379637575899124E-2</c:v>
                   </c:pt>
                   <c:pt idx="2">
-                    <c:v>0.33289187550792404</c:v>
+                    <c:v>7.363703690560075E-2</c:v>
                   </c:pt>
                   <c:pt idx="3">
-                    <c:v>1.9581076837342344</c:v>
+                    <c:v>0.51850990596929269</c:v>
                   </c:pt>
                   <c:pt idx="4">
-                    <c:v>0.5676684152607071</c:v>
+                    <c:v>0.21565453045726077</c:v>
                   </c:pt>
                   <c:pt idx="5">
-                    <c:v>1.3210430355378584</c:v>
+                    <c:v>1.720501115421688</c:v>
                   </c:pt>
                   <c:pt idx="6">
-                    <c:v>2.3222215788279272</c:v>
+                    <c:v>1.2851809381371342</c:v>
                   </c:pt>
                   <c:pt idx="7">
-                    <c:v>3.3322207005088007</c:v>
+                    <c:v>2.3060468185777867</c:v>
                   </c:pt>
                   <c:pt idx="8">
-                    <c:v>5.8587407875674655</c:v>
+                    <c:v>4.04674163930021</c:v>
                   </c:pt>
                   <c:pt idx="9">
-                    <c:v>19.144139467378661</c:v>
+                    <c:v>5.6476450330974126</c:v>
                   </c:pt>
                   <c:pt idx="10">
-                    <c:v>16.459797324933401</c:v>
+                    <c:v>9.2874762005175882</c:v>
                   </c:pt>
                   <c:pt idx="11">
-                    <c:v>20.136876850682679</c:v>
+                    <c:v>6.8734025366196665</c:v>
                   </c:pt>
                   <c:pt idx="12">
-                    <c:v>55.846069899647283</c:v>
+                    <c:v>10.978000085970496</c:v>
                   </c:pt>
                   <c:pt idx="13">
-                    <c:v>31.778512699215725</c:v>
+                    <c:v>9.8705491803496361</c:v>
                   </c:pt>
                   <c:pt idx="14">
-                    <c:v>22.061646901200081</c:v>
+                    <c:v>8.2502678942779486</c:v>
                   </c:pt>
                   <c:pt idx="15">
-                    <c:v>55.481725840258754</c:v>
+                    <c:v>15.980150350482631</c:v>
                   </c:pt>
                   <c:pt idx="16">
-                    <c:v>37.778037707911508</c:v>
+                    <c:v>7.1893605399034994</c:v>
                   </c:pt>
                   <c:pt idx="17">
-                    <c:v>43.991960037979766</c:v>
+                    <c:v>34.143796075485824</c:v>
                   </c:pt>
                   <c:pt idx="18">
-                    <c:v>96.028657635755508</c:v>
+                    <c:v>20.862356651634709</c:v>
                   </c:pt>
                   <c:pt idx="19">
-                    <c:v>67.11794410194824</c:v>
+                    <c:v>13.720370112301307</c:v>
                   </c:pt>
                   <c:pt idx="20">
-                    <c:v>0</c:v>
+                    <c:v>28.604827599419476</c:v>
                   </c:pt>
                   <c:pt idx="21">
-                    <c:v>0</c:v>
+                    <c:v>38.076598228091079</c:v>
                   </c:pt>
                   <c:pt idx="22">
-                    <c:v>0</c:v>
+                    <c:v>43.044511830176766</c:v>
                   </c:pt>
                   <c:pt idx="23">
-                    <c:v>0</c:v>
+                    <c:v>116.90130580113035</c:v>
                   </c:pt>
                   <c:pt idx="24">
-                    <c:v>0</c:v>
+                    <c:v>68.745835729073562</c:v>
                   </c:pt>
                   <c:pt idx="25">
                     <c:v>0</c:v>
@@ -2569,7 +2565,7 @@
           </c:errBars>
           <c:xVal>
             <c:numRef>
-              <c:f>'Particles RmWat'!$E$2:$E$35</c:f>
+              <c:f>'Particles RmWat PartSize'!$E$2:$E$35</c:f>
               <c:numCache>
                 <c:formatCode>General</c:formatCode>
                 <c:ptCount val="34"/>
@@ -2577,172 +2573,187 @@
                   <c:v>0</c:v>
                 </c:pt>
                 <c:pt idx="1">
-                  <c:v>5.8177641733144318E-2</c:v>
+                  <c:v>5.9573905134739778E-2</c:v>
                 </c:pt>
                 <c:pt idx="2">
-                  <c:v>0.11635528346628864</c:v>
+                  <c:v>0.11914781026947956</c:v>
                 </c:pt>
                 <c:pt idx="3">
-                  <c:v>0.17453292519943295</c:v>
+                  <c:v>0.17872171540421933</c:v>
                 </c:pt>
                 <c:pt idx="4">
-                  <c:v>0.23271056693257727</c:v>
+                  <c:v>0.23829562053895911</c:v>
                 </c:pt>
                 <c:pt idx="5">
-                  <c:v>0.29088820866572157</c:v>
+                  <c:v>0.29786952567369884</c:v>
                 </c:pt>
                 <c:pt idx="6">
-                  <c:v>0.3490658503988659</c:v>
+                  <c:v>0.35744343080843866</c:v>
                 </c:pt>
                 <c:pt idx="7">
-                  <c:v>0.40724349213201022</c:v>
+                  <c:v>0.41701733594317847</c:v>
                 </c:pt>
                 <c:pt idx="8">
-                  <c:v>0.46542113386515455</c:v>
+                  <c:v>0.47659124107791823</c:v>
                 </c:pt>
                 <c:pt idx="9">
-                  <c:v>0.52359877559829893</c:v>
+                  <c:v>0.53616514621265798</c:v>
                 </c:pt>
                 <c:pt idx="10">
-                  <c:v>0.58177641733144314</c:v>
+                  <c:v>0.55602311459090459</c:v>
                 </c:pt>
                 <c:pt idx="11">
-                  <c:v>0.60116896457582458</c:v>
+                  <c:v>0.57588108296915119</c:v>
                 </c:pt>
                 <c:pt idx="12">
-                  <c:v>0.62056151182020602</c:v>
+                  <c:v>0.59573905134739769</c:v>
                 </c:pt>
                 <c:pt idx="13">
-                  <c:v>0.63995405906458758</c:v>
+                  <c:v>0.6155970197256444</c:v>
                 </c:pt>
                 <c:pt idx="14">
-                  <c:v>0.65934660630896891</c:v>
+                  <c:v>0.63545498810389089</c:v>
                 </c:pt>
                 <c:pt idx="15">
-                  <c:v>0.67873915355335046</c:v>
+                  <c:v>0.6553129564821375</c:v>
                 </c:pt>
                 <c:pt idx="16">
-                  <c:v>0.69813170079773179</c:v>
+                  <c:v>0.6751709248603841</c:v>
                 </c:pt>
                 <c:pt idx="17">
-                  <c:v>0.71752424804211334</c:v>
+                  <c:v>0.69502889323863071</c:v>
                 </c:pt>
                 <c:pt idx="18">
-                  <c:v>0.73691679528649467</c:v>
+                  <c:v>0.71488686161687731</c:v>
                 </c:pt>
                 <c:pt idx="19">
-                  <c:v>0.75630934253087612</c:v>
+                  <c:v>0.73474482999512392</c:v>
                 </c:pt>
                 <c:pt idx="20">
-                  <c:v>0.77570188977525756</c:v>
+                  <c:v>0.75460279837337052</c:v>
                 </c:pt>
                 <c:pt idx="21">
-                  <c:v>0.795094437019639</c:v>
+                  <c:v>0.77446076675161712</c:v>
                 </c:pt>
                 <c:pt idx="22">
-                  <c:v>0.81448698426402044</c:v>
+                  <c:v>0.79431873512986362</c:v>
                 </c:pt>
                 <c:pt idx="23">
-                  <c:v>0.83387953150840188</c:v>
+                  <c:v>0.81417670350811022</c:v>
                 </c:pt>
                 <c:pt idx="24">
-                  <c:v>0.85327207875278333</c:v>
+                  <c:v>0.83403467188635694</c:v>
                 </c:pt>
                 <c:pt idx="25">
-                  <c:v>0.87266462599716477</c:v>
+                  <c:v>0.85389264026460354</c:v>
                 </c:pt>
                 <c:pt idx="26">
-                  <c:v>0.8920571732415461</c:v>
+                  <c:v>0.87375060864285004</c:v>
                 </c:pt>
                 <c:pt idx="27">
-                  <c:v>0.91144972048592765</c:v>
+                  <c:v>0.89360857702109664</c:v>
                 </c:pt>
                 <c:pt idx="28">
-                  <c:v>0.93084226773030909</c:v>
+                  <c:v>0.91346654539934324</c:v>
                 </c:pt>
                 <c:pt idx="29">
-                  <c:v>0.95023481497469053</c:v>
+                  <c:v>0.93332451377758974</c:v>
                 </c:pt>
                 <c:pt idx="30">
-                  <c:v>0.96962736221907198</c:v>
+                  <c:v>0.95318248215583645</c:v>
                 </c:pt>
                 <c:pt idx="31">
-                  <c:v>0.98901990946345342</c:v>
+                  <c:v>0.97304045053408306</c:v>
                 </c:pt>
                 <c:pt idx="32">
-                  <c:v>1.008412456707835</c:v>
+                  <c:v>0.99289841891232966</c:v>
                 </c:pt>
                 <c:pt idx="33">
-                  <c:v>1.0278050039522162</c:v>
+                  <c:v>1.0127563872905763</c:v>
                 </c:pt>
               </c:numCache>
             </c:numRef>
           </c:xVal>
           <c:yVal>
             <c:numRef>
-              <c:f>'Particles RmWat'!$M$2:$M$21</c:f>
+              <c:f>'Particles RmWat PartSize'!$M$2:$M$26</c:f>
               <c:numCache>
                 <c:formatCode>General</c:formatCode>
-                <c:ptCount val="20"/>
+                <c:ptCount val="25"/>
                 <c:pt idx="0">
                   <c:v>1</c:v>
                 </c:pt>
                 <c:pt idx="1">
-                  <c:v>1.7163273245157122</c:v>
+                  <c:v>1.4305692463102144</c:v>
                 </c:pt>
                 <c:pt idx="2">
-                  <c:v>2.3746406577611334</c:v>
+                  <c:v>2.035872423746059</c:v>
                 </c:pt>
                 <c:pt idx="3">
-                  <c:v>4.5978671884272027</c:v>
+                  <c:v>2.9121132947101365</c:v>
                 </c:pt>
                 <c:pt idx="4">
-                  <c:v>5.3915824904724854</c:v>
+                  <c:v>3.9473896362310503</c:v>
                 </c:pt>
                 <c:pt idx="5">
-                  <c:v>4.8766782353988374</c:v>
+                  <c:v>6.1404897401789951</c:v>
                 </c:pt>
                 <c:pt idx="6">
-                  <c:v>13.665423941423919</c:v>
+                  <c:v>4.8647956036492941</c:v>
                 </c:pt>
                 <c:pt idx="7">
-                  <c:v>11.97773046529875</c:v>
+                  <c:v>11.619559680900572</c:v>
                 </c:pt>
                 <c:pt idx="8">
-                  <c:v>19.842913869951079</c:v>
+                  <c:v>16.458092243724341</c:v>
                 </c:pt>
                 <c:pt idx="9">
-                  <c:v>35.41463272915486</c:v>
+                  <c:v>24.462247718580787</c:v>
                 </c:pt>
                 <c:pt idx="10">
-                  <c:v>47.544639536877085</c:v>
+                  <c:v>25.178592586349474</c:v>
                 </c:pt>
                 <c:pt idx="11">
-                  <c:v>63.023782357285086</c:v>
+                  <c:v>21.167298171810931</c:v>
                 </c:pt>
                 <c:pt idx="12">
-                  <c:v>90.321977898803965</c:v>
+                  <c:v>27.913265761061414</c:v>
                 </c:pt>
                 <c:pt idx="13">
-                  <c:v>67.657072943177781</c:v>
+                  <c:v>34.646848154160537</c:v>
                 </c:pt>
                 <c:pt idx="14">
-                  <c:v>73.92101690556882</c:v>
+                  <c:v>41.962698444689558</c:v>
                 </c:pt>
                 <c:pt idx="15">
-                  <c:v>103.69347612516978</c:v>
+                  <c:v>66.671743137420151</c:v>
                 </c:pt>
                 <c:pt idx="16">
-                  <c:v>87.098243343926796</c:v>
+                  <c:v>73.055528235120221</c:v>
                 </c:pt>
                 <c:pt idx="17">
-                  <c:v>192.13891116004908</c:v>
+                  <c:v>99.86270125409348</c:v>
                 </c:pt>
                 <c:pt idx="18">
-                  <c:v>148.69708504213207</c:v>
+                  <c:v>107.88417340618238</c:v>
                 </c:pt>
                 <c:pt idx="19">
-                  <c:v>205.7630207165746</c:v>
+                  <c:v>114.44214350190978</c:v>
+                </c:pt>
+                <c:pt idx="20">
+                  <c:v>170.08655651360303</c:v>
+                </c:pt>
+                <c:pt idx="21">
+                  <c:v>204.78566910840513</c:v>
+                </c:pt>
+                <c:pt idx="22">
+                  <c:v>248.31087300394901</c:v>
+                </c:pt>
+                <c:pt idx="23">
+                  <c:v>368.80574779614471</c:v>
+                </c:pt>
+                <c:pt idx="24">
+                  <c:v>333.75295372178829</c:v>
                 </c:pt>
               </c:numCache>
             </c:numRef>
@@ -2750,7 +2761,7 @@
           <c:smooth val="0"/>
           <c:extLst>
             <c:ext xmlns:c16="http://schemas.microsoft.com/office/drawing/2014/chart" uri="{C3380CC4-5D6E-409C-BE32-E72D297353CC}">
-              <c16:uniqueId val="{00000000-BE1F-446B-A6E7-F6CD86CA0D1A}"/>
+              <c16:uniqueId val="{00000000-1EFB-405D-93BD-B50DA741DA16}"/>
             </c:ext>
           </c:extLst>
         </c:ser>
@@ -2793,7 +2804,7 @@
               <a:lstStyle/>
               <a:p>
                 <a:pPr>
-                  <a:defRPr sz="1200" b="0" i="0" u="none" strike="noStrike" kern="1200" baseline="0">
+                  <a:defRPr sz="1200" b="1" i="0" u="none" strike="noStrike" kern="1200" baseline="0">
                     <a:solidFill>
                       <a:schemeClr val="tx1">
                         <a:lumMod val="65000"/>
@@ -2806,17 +2817,13 @@
                   </a:defRPr>
                 </a:pPr>
                 <a:r>
-                  <a:rPr lang="en-SG" sz="1200"/>
-                  <a:t>Fill</a:t>
+                  <a:rPr lang="en-SG"/>
+                  <a:t>Fill fraction (phi)</a:t>
                 </a:r>
-                <a:r>
-                  <a:rPr lang="en-SG" sz="1200" baseline="0"/>
-                  <a:t> fraction (phi)</a:t>
-                </a:r>
-                <a:endParaRPr lang="en-SG" sz="1200"/>
               </a:p>
             </c:rich>
           </c:tx>
+          <c:layout/>
           <c:overlay val="0"/>
           <c:spPr>
             <a:noFill/>
@@ -2830,7 +2837,7 @@
             <a:lstStyle/>
             <a:p>
               <a:pPr>
-                <a:defRPr sz="1200" b="0" i="0" u="none" strike="noStrike" kern="1200" baseline="0">
+                <a:defRPr sz="1200" b="1" i="0" u="none" strike="noStrike" kern="1200" baseline="0">
                   <a:solidFill>
                     <a:schemeClr val="tx1">
                       <a:lumMod val="65000"/>
@@ -2868,7 +2875,7 @@
           <a:lstStyle/>
           <a:p>
             <a:pPr>
-              <a:defRPr sz="900" b="0" i="0" u="none" strike="noStrike" kern="1200" baseline="0">
+              <a:defRPr sz="1200" b="0" i="0" u="none" strike="noStrike" kern="1200" baseline="0">
                 <a:solidFill>
                   <a:schemeClr val="tx1">
                     <a:lumMod val="65000"/>
@@ -2890,6 +2897,7 @@
       <c:valAx>
         <c:axId val="325989136"/>
         <c:scaling>
+          <c:logBase val="10"/>
           <c:orientation val="minMax"/>
         </c:scaling>
         <c:delete val="0"/>
@@ -2928,17 +2936,13 @@
                   </a:defRPr>
                 </a:pPr>
                 <a:r>
-                  <a:rPr lang="en-SG" sz="1200" b="1"/>
-                  <a:t>Viscosity</a:t>
+                  <a:rPr lang="en-SG"/>
+                  <a:t>Viscosity (normalised to phi = 0)</a:t>
                 </a:r>
-                <a:r>
-                  <a:rPr lang="en-SG" sz="1200" b="1" baseline="0"/>
-                  <a:t> (normalised to phi = 0)</a:t>
-                </a:r>
-                <a:endParaRPr lang="en-SG" sz="1200" b="1"/>
               </a:p>
             </c:rich>
           </c:tx>
+          <c:layout/>
           <c:overlay val="0"/>
           <c:spPr>
             <a:noFill/>
@@ -2990,7 +2994,7 @@
           <a:lstStyle/>
           <a:p>
             <a:pPr>
-              <a:defRPr sz="900" b="0" i="0" u="none" strike="noStrike" kern="1200" baseline="0">
+              <a:defRPr sz="1200" b="0" i="0" u="none" strike="noStrike" kern="1200" baseline="0">
                 <a:solidFill>
                   <a:schemeClr val="tx1">
                     <a:lumMod val="65000"/>
@@ -3033,7 +3037,7 @@
     <a:lstStyle/>
     <a:p>
       <a:pPr>
-        <a:defRPr/>
+        <a:defRPr sz="1200" b="1"/>
       </a:pPr>
       <a:endParaRPr lang="en-US"/>
     </a:p>
@@ -3084,6 +3088,7 @@
           </a:p>
         </c:rich>
       </c:tx>
+      <c:layout/>
       <c:overlay val="0"/>
       <c:spPr>
         <a:noFill/>
@@ -4100,6 +4105,7 @@
       <c:valAx>
         <c:axId val="325989136"/>
         <c:scaling>
+          <c:logBase val="10"/>
           <c:orientation val="minMax"/>
         </c:scaling>
         <c:delete val="0"/>
@@ -4144,6 +4150,7 @@
               </a:p>
             </c:rich>
           </c:tx>
+          <c:layout/>
           <c:overlay val="0"/>
           <c:spPr>
             <a:noFill/>
@@ -5237,6 +5244,7 @@
               </a:p>
             </c:rich>
           </c:tx>
+          <c:layout/>
           <c:overlay val="0"/>
           <c:spPr>
             <a:noFill/>
@@ -5280,6 +5288,7 @@
       <c:valAx>
         <c:axId val="325989136"/>
         <c:scaling>
+          <c:logBase val="10"/>
           <c:orientation val="minMax"/>
         </c:scaling>
         <c:delete val="0"/>
@@ -5314,6 +5323,7 @@
               </a:p>
             </c:rich>
           </c:tx>
+          <c:layout/>
           <c:overlay val="0"/>
           <c:spPr>
             <a:noFill/>
@@ -5400,6 +5410,1130 @@
 </file>
 
 <file path=ppt/charts/chart7.xml><?xml version="1.0" encoding="utf-8"?>
+<c:chartSpace xmlns:c="http://schemas.openxmlformats.org/drawingml/2006/chart" xmlns:a="http://schemas.openxmlformats.org/drawingml/2006/main" xmlns:r="http://schemas.openxmlformats.org/officeDocument/2006/relationships" xmlns:c16r2="http://schemas.microsoft.com/office/drawing/2015/06/chart">
+  <c:date1904 val="0"/>
+  <c:lang val="en-US"/>
+  <c:roundedCorners val="0"/>
+  <mc:AlternateContent xmlns:mc="http://schemas.openxmlformats.org/markup-compatibility/2006">
+    <mc:Choice xmlns:c14="http://schemas.microsoft.com/office/drawing/2007/8/2/chart" Requires="c14">
+      <c14:style val="102"/>
+    </mc:Choice>
+    <mc:Fallback>
+      <c:style val="2"/>
+    </mc:Fallback>
+  </mc:AlternateContent>
+  <c:chart>
+    <c:title>
+      <c:tx>
+        <c:rich>
+          <a:bodyPr rot="0" vert="horz"/>
+          <a:lstStyle/>
+          <a:p>
+            <a:pPr>
+              <a:defRPr/>
+            </a:pPr>
+            <a:r>
+              <a:rPr lang="en-US"/>
+              <a:t>Norm Viscosity against Fill Fraction</a:t>
+            </a:r>
+          </a:p>
+        </c:rich>
+      </c:tx>
+      <c:layout/>
+      <c:overlay val="0"/>
+      <c:spPr>
+        <a:noFill/>
+        <a:ln>
+          <a:noFill/>
+        </a:ln>
+        <a:effectLst/>
+      </c:spPr>
+    </c:title>
+    <c:autoTitleDeleted val="0"/>
+    <c:plotArea>
+      <c:layout/>
+      <c:scatterChart>
+        <c:scatterStyle val="lineMarker"/>
+        <c:varyColors val="0"/>
+        <c:ser>
+          <c:idx val="1"/>
+          <c:order val="0"/>
+          <c:tx>
+            <c:v>1.8 and 2.5 particles</c:v>
+          </c:tx>
+          <c:spPr>
+            <a:ln w="25400">
+              <a:noFill/>
+            </a:ln>
+          </c:spPr>
+          <c:marker>
+            <c:symbol val="square"/>
+            <c:size val="4"/>
+          </c:marker>
+          <c:errBars>
+            <c:errDir val="y"/>
+            <c:errBarType val="both"/>
+            <c:errValType val="cust"/>
+            <c:noEndCap val="0"/>
+            <c:plus>
+              <c:numRef>
+                <c:f>'Particles RmWat 2Part'!$O$2:$O$35</c:f>
+                <c:numCache>
+                  <c:formatCode>General</c:formatCode>
+                  <c:ptCount val="34"/>
+                  <c:pt idx="0">
+                    <c:v>0</c:v>
+                  </c:pt>
+                  <c:pt idx="1">
+                    <c:v>0</c:v>
+                  </c:pt>
+                  <c:pt idx="2">
+                    <c:v>0</c:v>
+                  </c:pt>
+                  <c:pt idx="3">
+                    <c:v>0</c:v>
+                  </c:pt>
+                  <c:pt idx="4">
+                    <c:v>0</c:v>
+                  </c:pt>
+                  <c:pt idx="5">
+                    <c:v>2.7416350040965471</c:v>
+                  </c:pt>
+                  <c:pt idx="6">
+                    <c:v>0</c:v>
+                  </c:pt>
+                  <c:pt idx="7">
+                    <c:v>0</c:v>
+                  </c:pt>
+                  <c:pt idx="8">
+                    <c:v>0</c:v>
+                  </c:pt>
+                  <c:pt idx="9">
+                    <c:v>0</c:v>
+                  </c:pt>
+                  <c:pt idx="10">
+                    <c:v>6.5798496253292651</c:v>
+                  </c:pt>
+                  <c:pt idx="11">
+                    <c:v>3.6151205165248972</c:v>
+                  </c:pt>
+                  <c:pt idx="12">
+                    <c:v>7.9707978263156543</c:v>
+                  </c:pt>
+                  <c:pt idx="13">
+                    <c:v>23.398142753840766</c:v>
+                  </c:pt>
+                  <c:pt idx="14">
+                    <c:v>5.5116404550639801</c:v>
+                  </c:pt>
+                  <c:pt idx="15">
+                    <c:v>47.88828027952907</c:v>
+                  </c:pt>
+                  <c:pt idx="16">
+                    <c:v>17.345464079828044</c:v>
+                  </c:pt>
+                  <c:pt idx="17">
+                    <c:v>29.160350315718333</c:v>
+                  </c:pt>
+                  <c:pt idx="18">
+                    <c:v>33.486355485500653</c:v>
+                  </c:pt>
+                  <c:pt idx="19">
+                    <c:v>19.116531327264898</c:v>
+                  </c:pt>
+                  <c:pt idx="20">
+                    <c:v>0</c:v>
+                  </c:pt>
+                  <c:pt idx="21">
+                    <c:v>0</c:v>
+                  </c:pt>
+                  <c:pt idx="22">
+                    <c:v>0</c:v>
+                  </c:pt>
+                  <c:pt idx="23">
+                    <c:v>0</c:v>
+                  </c:pt>
+                  <c:pt idx="24">
+                    <c:v>0</c:v>
+                  </c:pt>
+                  <c:pt idx="25">
+                    <c:v>0</c:v>
+                  </c:pt>
+                  <c:pt idx="26">
+                    <c:v>0</c:v>
+                  </c:pt>
+                  <c:pt idx="27">
+                    <c:v>0</c:v>
+                  </c:pt>
+                  <c:pt idx="28">
+                    <c:v>0</c:v>
+                  </c:pt>
+                  <c:pt idx="29">
+                    <c:v>0</c:v>
+                  </c:pt>
+                  <c:pt idx="30">
+                    <c:v>0</c:v>
+                  </c:pt>
+                  <c:pt idx="31">
+                    <c:v>0</c:v>
+                  </c:pt>
+                  <c:pt idx="32">
+                    <c:v>0</c:v>
+                  </c:pt>
+                  <c:pt idx="33">
+                    <c:v>0</c:v>
+                  </c:pt>
+                </c:numCache>
+              </c:numRef>
+            </c:plus>
+            <c:minus>
+              <c:numRef>
+                <c:f>'Particles RmWat 2Part'!$O$2:$O$35</c:f>
+                <c:numCache>
+                  <c:formatCode>General</c:formatCode>
+                  <c:ptCount val="34"/>
+                  <c:pt idx="0">
+                    <c:v>0</c:v>
+                  </c:pt>
+                  <c:pt idx="1">
+                    <c:v>0</c:v>
+                  </c:pt>
+                  <c:pt idx="2">
+                    <c:v>0</c:v>
+                  </c:pt>
+                  <c:pt idx="3">
+                    <c:v>0</c:v>
+                  </c:pt>
+                  <c:pt idx="4">
+                    <c:v>0</c:v>
+                  </c:pt>
+                  <c:pt idx="5">
+                    <c:v>2.7416350040965471</c:v>
+                  </c:pt>
+                  <c:pt idx="6">
+                    <c:v>0</c:v>
+                  </c:pt>
+                  <c:pt idx="7">
+                    <c:v>0</c:v>
+                  </c:pt>
+                  <c:pt idx="8">
+                    <c:v>0</c:v>
+                  </c:pt>
+                  <c:pt idx="9">
+                    <c:v>0</c:v>
+                  </c:pt>
+                  <c:pt idx="10">
+                    <c:v>6.5798496253292651</c:v>
+                  </c:pt>
+                  <c:pt idx="11">
+                    <c:v>3.6151205165248972</c:v>
+                  </c:pt>
+                  <c:pt idx="12">
+                    <c:v>7.9707978263156543</c:v>
+                  </c:pt>
+                  <c:pt idx="13">
+                    <c:v>23.398142753840766</c:v>
+                  </c:pt>
+                  <c:pt idx="14">
+                    <c:v>5.5116404550639801</c:v>
+                  </c:pt>
+                  <c:pt idx="15">
+                    <c:v>47.88828027952907</c:v>
+                  </c:pt>
+                  <c:pt idx="16">
+                    <c:v>17.345464079828044</c:v>
+                  </c:pt>
+                  <c:pt idx="17">
+                    <c:v>29.160350315718333</c:v>
+                  </c:pt>
+                  <c:pt idx="18">
+                    <c:v>33.486355485500653</c:v>
+                  </c:pt>
+                  <c:pt idx="19">
+                    <c:v>19.116531327264898</c:v>
+                  </c:pt>
+                  <c:pt idx="20">
+                    <c:v>0</c:v>
+                  </c:pt>
+                  <c:pt idx="21">
+                    <c:v>0</c:v>
+                  </c:pt>
+                  <c:pt idx="22">
+                    <c:v>0</c:v>
+                  </c:pt>
+                  <c:pt idx="23">
+                    <c:v>0</c:v>
+                  </c:pt>
+                  <c:pt idx="24">
+                    <c:v>0</c:v>
+                  </c:pt>
+                  <c:pt idx="25">
+                    <c:v>0</c:v>
+                  </c:pt>
+                  <c:pt idx="26">
+                    <c:v>0</c:v>
+                  </c:pt>
+                  <c:pt idx="27">
+                    <c:v>0</c:v>
+                  </c:pt>
+                  <c:pt idx="28">
+                    <c:v>0</c:v>
+                  </c:pt>
+                  <c:pt idx="29">
+                    <c:v>0</c:v>
+                  </c:pt>
+                  <c:pt idx="30">
+                    <c:v>0</c:v>
+                  </c:pt>
+                  <c:pt idx="31">
+                    <c:v>0</c:v>
+                  </c:pt>
+                  <c:pt idx="32">
+                    <c:v>0</c:v>
+                  </c:pt>
+                  <c:pt idx="33">
+                    <c:v>0</c:v>
+                  </c:pt>
+                </c:numCache>
+              </c:numRef>
+            </c:minus>
+          </c:errBars>
+          <c:xVal>
+            <c:numRef>
+              <c:f>'Particles RmWat 2Part'!$E$2:$E$35</c:f>
+              <c:numCache>
+                <c:formatCode>General</c:formatCode>
+                <c:ptCount val="34"/>
+                <c:pt idx="0">
+                  <c:v>0</c:v>
+                </c:pt>
+                <c:pt idx="1">
+                  <c:v>5.3261553436504648E-2</c:v>
+                </c:pt>
+                <c:pt idx="2">
+                  <c:v>0.1065231068730093</c:v>
+                </c:pt>
+                <c:pt idx="3">
+                  <c:v>0.15978466030951394</c:v>
+                </c:pt>
+                <c:pt idx="4">
+                  <c:v>0.21304621374601859</c:v>
+                </c:pt>
+                <c:pt idx="5">
+                  <c:v>0.26630776718252325</c:v>
+                </c:pt>
+                <c:pt idx="6">
+                  <c:v>0.31956932061902787</c:v>
+                </c:pt>
+                <c:pt idx="7">
+                  <c:v>0.3728308740555325</c:v>
+                </c:pt>
+                <c:pt idx="8">
+                  <c:v>0.42609242749203718</c:v>
+                </c:pt>
+                <c:pt idx="9">
+                  <c:v>0.47935398092854181</c:v>
+                </c:pt>
+                <c:pt idx="10">
+                  <c:v>0.50598475764679418</c:v>
+                </c:pt>
+                <c:pt idx="11">
+                  <c:v>0.53261553436504649</c:v>
+                </c:pt>
+                <c:pt idx="12">
+                  <c:v>0.55924631108329881</c:v>
+                </c:pt>
+                <c:pt idx="13">
+                  <c:v>0.58587708780155112</c:v>
+                </c:pt>
+                <c:pt idx="14">
+                  <c:v>0.61250786451980332</c:v>
+                </c:pt>
+                <c:pt idx="15">
+                  <c:v>0.63913864123805575</c:v>
+                </c:pt>
+                <c:pt idx="16">
+                  <c:v>0.66576941795630817</c:v>
+                </c:pt>
+                <c:pt idx="17">
+                  <c:v>0.69240019467456038</c:v>
+                </c:pt>
+                <c:pt idx="18">
+                  <c:v>0.71903097139281269</c:v>
+                </c:pt>
+                <c:pt idx="19">
+                  <c:v>0.745661748111065</c:v>
+                </c:pt>
+                <c:pt idx="20">
+                  <c:v>0.77229252482931743</c:v>
+                </c:pt>
+                <c:pt idx="21">
+                  <c:v>0.79892330154756963</c:v>
+                </c:pt>
+                <c:pt idx="22">
+                  <c:v>0.82555407826582194</c:v>
+                </c:pt>
+                <c:pt idx="23">
+                  <c:v>0.85218485498407437</c:v>
+                </c:pt>
+                <c:pt idx="24">
+                  <c:v>0.87881563170232668</c:v>
+                </c:pt>
+                <c:pt idx="25">
+                  <c:v>0.905446408420579</c:v>
+                </c:pt>
+                <c:pt idx="26">
+                  <c:v>0.9320771851388312</c:v>
+                </c:pt>
+                <c:pt idx="27">
+                  <c:v>0.95870796185708362</c:v>
+                </c:pt>
+                <c:pt idx="28">
+                  <c:v>0.98533873857533605</c:v>
+                </c:pt>
+                <c:pt idx="29">
+                  <c:v>1.0119695152935884</c:v>
+                </c:pt>
+                <c:pt idx="30">
+                  <c:v>1.0386002920118405</c:v>
+                </c:pt>
+                <c:pt idx="31">
+                  <c:v>1.065231068730093</c:v>
+                </c:pt>
+                <c:pt idx="32">
+                  <c:v>1.0918618454483453</c:v>
+                </c:pt>
+                <c:pt idx="33">
+                  <c:v>1.1184926221665976</c:v>
+                </c:pt>
+              </c:numCache>
+            </c:numRef>
+          </c:xVal>
+          <c:yVal>
+            <c:numRef>
+              <c:f>'Particles RmWat 2Part'!$M$2:$M$21</c:f>
+              <c:numCache>
+                <c:formatCode>General</c:formatCode>
+                <c:ptCount val="20"/>
+                <c:pt idx="0">
+                  <c:v>1</c:v>
+                </c:pt>
+                <c:pt idx="1">
+                  <c:v>1.593438481578324</c:v>
+                </c:pt>
+                <c:pt idx="2">
+                  <c:v>1.9804216615272732</c:v>
+                </c:pt>
+                <c:pt idx="3">
+                  <c:v>4.282706518696787</c:v>
+                </c:pt>
+                <c:pt idx="4">
+                  <c:v>3.5489924954487062</c:v>
+                </c:pt>
+                <c:pt idx="5">
+                  <c:v>6.1004944822290215</c:v>
+                </c:pt>
+                <c:pt idx="6">
+                  <c:v>4.3831100946621273</c:v>
+                </c:pt>
+                <c:pt idx="7">
+                  <c:v>9.3046436354850215</c:v>
+                </c:pt>
+                <c:pt idx="8">
+                  <c:v>22.102984835399855</c:v>
+                </c:pt>
+                <c:pt idx="9">
+                  <c:v>13.67264654448546</c:v>
+                </c:pt>
+                <c:pt idx="10">
+                  <c:v>23.377565769485635</c:v>
+                </c:pt>
+                <c:pt idx="11">
+                  <c:v>25.120707729185451</c:v>
+                </c:pt>
+                <c:pt idx="12">
+                  <c:v>24.937348838433259</c:v>
+                </c:pt>
+                <c:pt idx="13">
+                  <c:v>43.744134751790014</c:v>
+                </c:pt>
+                <c:pt idx="14">
+                  <c:v>27.942305143619937</c:v>
+                </c:pt>
+                <c:pt idx="15">
+                  <c:v>66.468165344140004</c:v>
+                </c:pt>
+                <c:pt idx="16">
+                  <c:v>71.000034448689391</c:v>
+                </c:pt>
+                <c:pt idx="17">
+                  <c:v>74.976834213290005</c:v>
+                </c:pt>
+                <c:pt idx="18">
+                  <c:v>86.362880101815023</c:v>
+                </c:pt>
+                <c:pt idx="19">
+                  <c:v>113.39735127854874</c:v>
+                </c:pt>
+              </c:numCache>
+            </c:numRef>
+          </c:yVal>
+          <c:smooth val="0"/>
+          <c:extLst>
+            <c:ext xmlns:c16="http://schemas.microsoft.com/office/drawing/2014/chart" uri="{C3380CC4-5D6E-409C-BE32-E72D297353CC}">
+              <c16:uniqueId val="{00000000-4829-4987-B623-FD6A2D5545FB}"/>
+            </c:ext>
+          </c:extLst>
+        </c:ser>
+        <c:ser>
+          <c:idx val="0"/>
+          <c:order val="1"/>
+          <c:tx>
+            <c:v>2.5 particles only</c:v>
+          </c:tx>
+          <c:spPr>
+            <a:ln w="25400" cap="rnd">
+              <a:noFill/>
+              <a:round/>
+            </a:ln>
+            <a:effectLst/>
+          </c:spPr>
+          <c:marker>
+            <c:symbol val="diamond"/>
+            <c:size val="4"/>
+          </c:marker>
+          <c:errBars>
+            <c:errDir val="y"/>
+            <c:errBarType val="both"/>
+            <c:errValType val="cust"/>
+            <c:noEndCap val="0"/>
+            <c:plus>
+              <c:numRef>
+                <c:f>'Particles RmWat'!$O$2:$O$35</c:f>
+                <c:numCache>
+                  <c:formatCode>General</c:formatCode>
+                  <c:ptCount val="34"/>
+                  <c:pt idx="0">
+                    <c:v>1.2363104446316418E-2</c:v>
+                  </c:pt>
+                  <c:pt idx="1">
+                    <c:v>0.17746041722012768</c:v>
+                  </c:pt>
+                  <c:pt idx="2">
+                    <c:v>0.33289187550792404</c:v>
+                  </c:pt>
+                  <c:pt idx="3">
+                    <c:v>1.9581076837342344</c:v>
+                  </c:pt>
+                  <c:pt idx="4">
+                    <c:v>0.5676684152607071</c:v>
+                  </c:pt>
+                  <c:pt idx="5">
+                    <c:v>1.3210430355378584</c:v>
+                  </c:pt>
+                  <c:pt idx="6">
+                    <c:v>2.3222215788279272</c:v>
+                  </c:pt>
+                  <c:pt idx="7">
+                    <c:v>3.3322207005088007</c:v>
+                  </c:pt>
+                  <c:pt idx="8">
+                    <c:v>5.8587407875674655</c:v>
+                  </c:pt>
+                  <c:pt idx="9">
+                    <c:v>19.144139467378661</c:v>
+                  </c:pt>
+                  <c:pt idx="10">
+                    <c:v>16.459797324933401</c:v>
+                  </c:pt>
+                  <c:pt idx="11">
+                    <c:v>20.136876850682679</c:v>
+                  </c:pt>
+                  <c:pt idx="12">
+                    <c:v>55.846069899647283</c:v>
+                  </c:pt>
+                  <c:pt idx="13">
+                    <c:v>31.778512699215725</c:v>
+                  </c:pt>
+                  <c:pt idx="14">
+                    <c:v>22.061646901200081</c:v>
+                  </c:pt>
+                  <c:pt idx="15">
+                    <c:v>55.481725840258754</c:v>
+                  </c:pt>
+                  <c:pt idx="16">
+                    <c:v>37.778037707911508</c:v>
+                  </c:pt>
+                  <c:pt idx="17">
+                    <c:v>43.991960037979766</c:v>
+                  </c:pt>
+                  <c:pt idx="18">
+                    <c:v>96.028657635755508</c:v>
+                  </c:pt>
+                  <c:pt idx="19">
+                    <c:v>67.11794410194824</c:v>
+                  </c:pt>
+                  <c:pt idx="20">
+                    <c:v>0</c:v>
+                  </c:pt>
+                  <c:pt idx="21">
+                    <c:v>0</c:v>
+                  </c:pt>
+                  <c:pt idx="22">
+                    <c:v>0</c:v>
+                  </c:pt>
+                  <c:pt idx="23">
+                    <c:v>0</c:v>
+                  </c:pt>
+                  <c:pt idx="24">
+                    <c:v>0</c:v>
+                  </c:pt>
+                  <c:pt idx="25">
+                    <c:v>0</c:v>
+                  </c:pt>
+                  <c:pt idx="26">
+                    <c:v>0</c:v>
+                  </c:pt>
+                  <c:pt idx="27">
+                    <c:v>0</c:v>
+                  </c:pt>
+                  <c:pt idx="28">
+                    <c:v>0</c:v>
+                  </c:pt>
+                  <c:pt idx="29">
+                    <c:v>0</c:v>
+                  </c:pt>
+                  <c:pt idx="30">
+                    <c:v>0</c:v>
+                  </c:pt>
+                  <c:pt idx="31">
+                    <c:v>0</c:v>
+                  </c:pt>
+                  <c:pt idx="32">
+                    <c:v>0</c:v>
+                  </c:pt>
+                  <c:pt idx="33">
+                    <c:v>0</c:v>
+                  </c:pt>
+                </c:numCache>
+              </c:numRef>
+            </c:plus>
+            <c:minus>
+              <c:numRef>
+                <c:f>'Particles RmWat'!$O$2:$O$35</c:f>
+                <c:numCache>
+                  <c:formatCode>General</c:formatCode>
+                  <c:ptCount val="34"/>
+                  <c:pt idx="0">
+                    <c:v>1.2363104446316418E-2</c:v>
+                  </c:pt>
+                  <c:pt idx="1">
+                    <c:v>0.17746041722012768</c:v>
+                  </c:pt>
+                  <c:pt idx="2">
+                    <c:v>0.33289187550792404</c:v>
+                  </c:pt>
+                  <c:pt idx="3">
+                    <c:v>1.9581076837342344</c:v>
+                  </c:pt>
+                  <c:pt idx="4">
+                    <c:v>0.5676684152607071</c:v>
+                  </c:pt>
+                  <c:pt idx="5">
+                    <c:v>1.3210430355378584</c:v>
+                  </c:pt>
+                  <c:pt idx="6">
+                    <c:v>2.3222215788279272</c:v>
+                  </c:pt>
+                  <c:pt idx="7">
+                    <c:v>3.3322207005088007</c:v>
+                  </c:pt>
+                  <c:pt idx="8">
+                    <c:v>5.8587407875674655</c:v>
+                  </c:pt>
+                  <c:pt idx="9">
+                    <c:v>19.144139467378661</c:v>
+                  </c:pt>
+                  <c:pt idx="10">
+                    <c:v>16.459797324933401</c:v>
+                  </c:pt>
+                  <c:pt idx="11">
+                    <c:v>20.136876850682679</c:v>
+                  </c:pt>
+                  <c:pt idx="12">
+                    <c:v>55.846069899647283</c:v>
+                  </c:pt>
+                  <c:pt idx="13">
+                    <c:v>31.778512699215725</c:v>
+                  </c:pt>
+                  <c:pt idx="14">
+                    <c:v>22.061646901200081</c:v>
+                  </c:pt>
+                  <c:pt idx="15">
+                    <c:v>55.481725840258754</c:v>
+                  </c:pt>
+                  <c:pt idx="16">
+                    <c:v>37.778037707911508</c:v>
+                  </c:pt>
+                  <c:pt idx="17">
+                    <c:v>43.991960037979766</c:v>
+                  </c:pt>
+                  <c:pt idx="18">
+                    <c:v>96.028657635755508</c:v>
+                  </c:pt>
+                  <c:pt idx="19">
+                    <c:v>67.11794410194824</c:v>
+                  </c:pt>
+                  <c:pt idx="20">
+                    <c:v>0</c:v>
+                  </c:pt>
+                  <c:pt idx="21">
+                    <c:v>0</c:v>
+                  </c:pt>
+                  <c:pt idx="22">
+                    <c:v>0</c:v>
+                  </c:pt>
+                  <c:pt idx="23">
+                    <c:v>0</c:v>
+                  </c:pt>
+                  <c:pt idx="24">
+                    <c:v>0</c:v>
+                  </c:pt>
+                  <c:pt idx="25">
+                    <c:v>0</c:v>
+                  </c:pt>
+                  <c:pt idx="26">
+                    <c:v>0</c:v>
+                  </c:pt>
+                  <c:pt idx="27">
+                    <c:v>0</c:v>
+                  </c:pt>
+                  <c:pt idx="28">
+                    <c:v>0</c:v>
+                  </c:pt>
+                  <c:pt idx="29">
+                    <c:v>0</c:v>
+                  </c:pt>
+                  <c:pt idx="30">
+                    <c:v>0</c:v>
+                  </c:pt>
+                  <c:pt idx="31">
+                    <c:v>0</c:v>
+                  </c:pt>
+                  <c:pt idx="32">
+                    <c:v>0</c:v>
+                  </c:pt>
+                  <c:pt idx="33">
+                    <c:v>0</c:v>
+                  </c:pt>
+                </c:numCache>
+              </c:numRef>
+            </c:minus>
+            <c:spPr>
+              <a:noFill/>
+              <a:ln w="9525" cap="flat" cmpd="sng" algn="ctr">
+                <a:solidFill>
+                  <a:schemeClr val="tx1">
+                    <a:lumMod val="65000"/>
+                    <a:lumOff val="35000"/>
+                  </a:schemeClr>
+                </a:solidFill>
+                <a:round/>
+              </a:ln>
+              <a:effectLst/>
+            </c:spPr>
+          </c:errBars>
+          <c:xVal>
+            <c:numRef>
+              <c:f>'Particles RmWat'!$E$2:$E$35</c:f>
+              <c:numCache>
+                <c:formatCode>General</c:formatCode>
+                <c:ptCount val="34"/>
+                <c:pt idx="0">
+                  <c:v>0</c:v>
+                </c:pt>
+                <c:pt idx="1">
+                  <c:v>5.8177641733144318E-2</c:v>
+                </c:pt>
+                <c:pt idx="2">
+                  <c:v>0.11635528346628864</c:v>
+                </c:pt>
+                <c:pt idx="3">
+                  <c:v>0.17453292519943295</c:v>
+                </c:pt>
+                <c:pt idx="4">
+                  <c:v>0.23271056693257727</c:v>
+                </c:pt>
+                <c:pt idx="5">
+                  <c:v>0.29088820866572157</c:v>
+                </c:pt>
+                <c:pt idx="6">
+                  <c:v>0.3490658503988659</c:v>
+                </c:pt>
+                <c:pt idx="7">
+                  <c:v>0.40724349213201022</c:v>
+                </c:pt>
+                <c:pt idx="8">
+                  <c:v>0.46542113386515455</c:v>
+                </c:pt>
+                <c:pt idx="9">
+                  <c:v>0.52359877559829893</c:v>
+                </c:pt>
+                <c:pt idx="10">
+                  <c:v>0.58177641733144314</c:v>
+                </c:pt>
+                <c:pt idx="11">
+                  <c:v>0.60116896457582458</c:v>
+                </c:pt>
+                <c:pt idx="12">
+                  <c:v>0.62056151182020602</c:v>
+                </c:pt>
+                <c:pt idx="13">
+                  <c:v>0.63995405906458758</c:v>
+                </c:pt>
+                <c:pt idx="14">
+                  <c:v>0.65934660630896891</c:v>
+                </c:pt>
+                <c:pt idx="15">
+                  <c:v>0.67873915355335046</c:v>
+                </c:pt>
+                <c:pt idx="16">
+                  <c:v>0.69813170079773179</c:v>
+                </c:pt>
+                <c:pt idx="17">
+                  <c:v>0.71752424804211334</c:v>
+                </c:pt>
+                <c:pt idx="18">
+                  <c:v>0.73691679528649467</c:v>
+                </c:pt>
+                <c:pt idx="19">
+                  <c:v>0.75630934253087612</c:v>
+                </c:pt>
+                <c:pt idx="20">
+                  <c:v>0.77570188977525756</c:v>
+                </c:pt>
+                <c:pt idx="21">
+                  <c:v>0.795094437019639</c:v>
+                </c:pt>
+                <c:pt idx="22">
+                  <c:v>0.81448698426402044</c:v>
+                </c:pt>
+                <c:pt idx="23">
+                  <c:v>0.83387953150840188</c:v>
+                </c:pt>
+                <c:pt idx="24">
+                  <c:v>0.85327207875278333</c:v>
+                </c:pt>
+                <c:pt idx="25">
+                  <c:v>0.87266462599716477</c:v>
+                </c:pt>
+                <c:pt idx="26">
+                  <c:v>0.8920571732415461</c:v>
+                </c:pt>
+                <c:pt idx="27">
+                  <c:v>0.91144972048592765</c:v>
+                </c:pt>
+                <c:pt idx="28">
+                  <c:v>0.93084226773030909</c:v>
+                </c:pt>
+                <c:pt idx="29">
+                  <c:v>0.95023481497469053</c:v>
+                </c:pt>
+                <c:pt idx="30">
+                  <c:v>0.96962736221907198</c:v>
+                </c:pt>
+                <c:pt idx="31">
+                  <c:v>0.98901990946345342</c:v>
+                </c:pt>
+                <c:pt idx="32">
+                  <c:v>1.008412456707835</c:v>
+                </c:pt>
+                <c:pt idx="33">
+                  <c:v>1.0278050039522162</c:v>
+                </c:pt>
+              </c:numCache>
+            </c:numRef>
+          </c:xVal>
+          <c:yVal>
+            <c:numRef>
+              <c:f>'Particles RmWat'!$M$2:$M$21</c:f>
+              <c:numCache>
+                <c:formatCode>General</c:formatCode>
+                <c:ptCount val="20"/>
+                <c:pt idx="0">
+                  <c:v>1</c:v>
+                </c:pt>
+                <c:pt idx="1">
+                  <c:v>1.7163273245157122</c:v>
+                </c:pt>
+                <c:pt idx="2">
+                  <c:v>2.3746406577611334</c:v>
+                </c:pt>
+                <c:pt idx="3">
+                  <c:v>4.5978671884272027</c:v>
+                </c:pt>
+                <c:pt idx="4">
+                  <c:v>5.3915824904724854</c:v>
+                </c:pt>
+                <c:pt idx="5">
+                  <c:v>4.8766782353988374</c:v>
+                </c:pt>
+                <c:pt idx="6">
+                  <c:v>13.665423941423919</c:v>
+                </c:pt>
+                <c:pt idx="7">
+                  <c:v>11.97773046529875</c:v>
+                </c:pt>
+                <c:pt idx="8">
+                  <c:v>19.842913869951079</c:v>
+                </c:pt>
+                <c:pt idx="9">
+                  <c:v>35.41463272915486</c:v>
+                </c:pt>
+                <c:pt idx="10">
+                  <c:v>47.544639536877085</c:v>
+                </c:pt>
+                <c:pt idx="11">
+                  <c:v>63.023782357285086</c:v>
+                </c:pt>
+                <c:pt idx="12">
+                  <c:v>90.321977898803965</c:v>
+                </c:pt>
+                <c:pt idx="13">
+                  <c:v>67.657072943177781</c:v>
+                </c:pt>
+                <c:pt idx="14">
+                  <c:v>73.92101690556882</c:v>
+                </c:pt>
+                <c:pt idx="15">
+                  <c:v>103.69347612516978</c:v>
+                </c:pt>
+                <c:pt idx="16">
+                  <c:v>87.098243343926796</c:v>
+                </c:pt>
+                <c:pt idx="17">
+                  <c:v>192.13891116004908</c:v>
+                </c:pt>
+                <c:pt idx="18">
+                  <c:v>148.69708504213207</c:v>
+                </c:pt>
+                <c:pt idx="19">
+                  <c:v>205.7630207165746</c:v>
+                </c:pt>
+              </c:numCache>
+            </c:numRef>
+          </c:yVal>
+          <c:smooth val="0"/>
+          <c:extLst>
+            <c:ext xmlns:c16="http://schemas.microsoft.com/office/drawing/2014/chart" uri="{C3380CC4-5D6E-409C-BE32-E72D297353CC}">
+              <c16:uniqueId val="{00000001-4829-4987-B623-FD6A2D5545FB}"/>
+            </c:ext>
+          </c:extLst>
+        </c:ser>
+        <c:dLbls>
+          <c:showLegendKey val="0"/>
+          <c:showVal val="0"/>
+          <c:showCatName val="0"/>
+          <c:showSerName val="0"/>
+          <c:showPercent val="0"/>
+          <c:showBubbleSize val="0"/>
+        </c:dLbls>
+        <c:axId val="325988808"/>
+        <c:axId val="325989136"/>
+      </c:scatterChart>
+      <c:valAx>
+        <c:axId val="325988808"/>
+        <c:scaling>
+          <c:orientation val="minMax"/>
+        </c:scaling>
+        <c:delete val="0"/>
+        <c:axPos val="b"/>
+        <c:majorGridlines>
+          <c:spPr>
+            <a:ln w="9525" cap="flat" cmpd="sng" algn="ctr">
+              <a:solidFill>
+                <a:schemeClr val="tx1">
+                  <a:lumMod val="15000"/>
+                  <a:lumOff val="85000"/>
+                </a:schemeClr>
+              </a:solidFill>
+              <a:round/>
+            </a:ln>
+            <a:effectLst/>
+          </c:spPr>
+        </c:majorGridlines>
+        <c:title>
+          <c:tx>
+            <c:rich>
+              <a:bodyPr rot="0" vert="horz"/>
+              <a:lstStyle/>
+              <a:p>
+                <a:pPr>
+                  <a:defRPr/>
+                </a:pPr>
+                <a:r>
+                  <a:rPr lang="en-SG"/>
+                  <a:t>Fill fraction (phi)</a:t>
+                </a:r>
+              </a:p>
+            </c:rich>
+          </c:tx>
+          <c:layout/>
+          <c:overlay val="0"/>
+          <c:spPr>
+            <a:noFill/>
+            <a:ln>
+              <a:noFill/>
+            </a:ln>
+            <a:effectLst/>
+          </c:spPr>
+        </c:title>
+        <c:numFmt formatCode="General" sourceLinked="1"/>
+        <c:majorTickMark val="none"/>
+        <c:minorTickMark val="none"/>
+        <c:tickLblPos val="nextTo"/>
+        <c:spPr>
+          <a:noFill/>
+          <a:ln w="9525" cap="flat" cmpd="sng" algn="ctr">
+            <a:solidFill>
+              <a:schemeClr val="tx1">
+                <a:lumMod val="25000"/>
+                <a:lumOff val="75000"/>
+              </a:schemeClr>
+            </a:solidFill>
+            <a:round/>
+          </a:ln>
+          <a:effectLst/>
+        </c:spPr>
+        <c:txPr>
+          <a:bodyPr rot="-60000000" vert="horz"/>
+          <a:lstStyle/>
+          <a:p>
+            <a:pPr>
+              <a:defRPr/>
+            </a:pPr>
+            <a:endParaRPr lang="en-US"/>
+          </a:p>
+        </c:txPr>
+        <c:crossAx val="325989136"/>
+        <c:crosses val="autoZero"/>
+        <c:crossBetween val="midCat"/>
+      </c:valAx>
+      <c:valAx>
+        <c:axId val="325989136"/>
+        <c:scaling>
+          <c:logBase val="10"/>
+          <c:orientation val="minMax"/>
+        </c:scaling>
+        <c:delete val="0"/>
+        <c:axPos val="l"/>
+        <c:majorGridlines>
+          <c:spPr>
+            <a:ln w="9525" cap="flat" cmpd="sng" algn="ctr">
+              <a:solidFill>
+                <a:schemeClr val="tx1">
+                  <a:lumMod val="15000"/>
+                  <a:lumOff val="85000"/>
+                </a:schemeClr>
+              </a:solidFill>
+              <a:round/>
+            </a:ln>
+            <a:effectLst/>
+          </c:spPr>
+        </c:majorGridlines>
+        <c:title>
+          <c:tx>
+            <c:rich>
+              <a:bodyPr rot="-5400000" vert="horz"/>
+              <a:lstStyle/>
+              <a:p>
+                <a:pPr>
+                  <a:defRPr/>
+                </a:pPr>
+                <a:r>
+                  <a:rPr lang="en-SG"/>
+                  <a:t>Viscosity (normalised to phi = 0)</a:t>
+                </a:r>
+              </a:p>
+            </c:rich>
+          </c:tx>
+          <c:layout/>
+          <c:overlay val="0"/>
+          <c:spPr>
+            <a:noFill/>
+            <a:ln>
+              <a:noFill/>
+            </a:ln>
+            <a:effectLst/>
+          </c:spPr>
+        </c:title>
+        <c:numFmt formatCode="General" sourceLinked="1"/>
+        <c:majorTickMark val="none"/>
+        <c:minorTickMark val="none"/>
+        <c:tickLblPos val="nextTo"/>
+        <c:spPr>
+          <a:noFill/>
+          <a:ln w="9525" cap="flat" cmpd="sng" algn="ctr">
+            <a:solidFill>
+              <a:schemeClr val="tx1">
+                <a:lumMod val="25000"/>
+                <a:lumOff val="75000"/>
+              </a:schemeClr>
+            </a:solidFill>
+            <a:round/>
+          </a:ln>
+          <a:effectLst/>
+        </c:spPr>
+        <c:txPr>
+          <a:bodyPr rot="-60000000" vert="horz"/>
+          <a:lstStyle/>
+          <a:p>
+            <a:pPr>
+              <a:defRPr/>
+            </a:pPr>
+            <a:endParaRPr lang="en-US"/>
+          </a:p>
+        </c:txPr>
+        <c:crossAx val="325988808"/>
+        <c:crosses val="autoZero"/>
+        <c:crossBetween val="midCat"/>
+      </c:valAx>
+    </c:plotArea>
+    <c:legend>
+      <c:legendPos val="r"/>
+      <c:layout>
+        <c:manualLayout>
+          <c:xMode val="edge"/>
+          <c:yMode val="edge"/>
+          <c:x val="0.14848432801722158"/>
+          <c:y val="0.16629921259842523"/>
+          <c:w val="0.22671308604630053"/>
+          <c:h val="0.25115157480314959"/>
+        </c:manualLayout>
+      </c:layout>
+      <c:overlay val="1"/>
+    </c:legend>
+    <c:plotVisOnly val="1"/>
+    <c:dispBlanksAs val="gap"/>
+    <c:showDLblsOverMax val="0"/>
+  </c:chart>
+  <c:txPr>
+    <a:bodyPr/>
+    <a:lstStyle/>
+    <a:p>
+      <a:pPr>
+        <a:defRPr sz="1200"/>
+      </a:pPr>
+      <a:endParaRPr lang="en-US"/>
+    </a:p>
+  </c:txPr>
+  <c:externalData r:id="rId1">
+    <c:autoUpdate val="0"/>
+  </c:externalData>
+</c:chartSpace>
+</file>
+
+<file path=ppt/charts/chart8.xml><?xml version="1.0" encoding="utf-8"?>
 <c:chartSpace xmlns:c="http://schemas.openxmlformats.org/drawingml/2006/chart" xmlns:a="http://schemas.openxmlformats.org/drawingml/2006/main" xmlns:r="http://schemas.openxmlformats.org/officeDocument/2006/relationships" xmlns:c16r2="http://schemas.microsoft.com/office/drawing/2015/06/chart">
   <c:date1904 val="0"/>
   <c:lang val="en-US"/>
@@ -12341,14 +13475,10 @@
   </p:clrMapOvr>
   <mc:AlternateContent xmlns:mc="http://schemas.openxmlformats.org/markup-compatibility/2006" xmlns:p14="http://schemas.microsoft.com/office/powerpoint/2010/main">
     <mc:Choice Requires="p14">
-      <p:transition spd="med" p14:dur="700">
-        <p:fade/>
-      </p:transition>
+      <p:transition p14:dur="0"/>
     </mc:Choice>
     <mc:Fallback xmlns="">
-      <p:transition spd="med">
-        <p:fade/>
-      </p:transition>
+      <p:transition/>
     </mc:Fallback>
   </mc:AlternateContent>
   <p:timing>
@@ -12401,31 +13531,6 @@
           </a:p>
         </p:txBody>
       </p:sp>
-      <p:graphicFrame>
-        <p:nvGraphicFramePr>
-          <p:cNvPr id="4" name="Content Placeholder 3"/>
-          <p:cNvGraphicFramePr>
-            <a:graphicFrameLocks noGrp="1"/>
-          </p:cNvGraphicFramePr>
-          <p:nvPr>
-            <p:ph idx="1"/>
-            <p:extLst>
-              <p:ext uri="{D42A27DB-BD31-4B8C-83A1-F6EECF244321}">
-                <p14:modId xmlns:p14="http://schemas.microsoft.com/office/powerpoint/2010/main" val="1896551542"/>
-              </p:ext>
-            </p:extLst>
-          </p:nvPr>
-        </p:nvGraphicFramePr>
-        <p:xfrm>
-          <a:off x="628650" y="1421816"/>
-          <a:ext cx="7886700" cy="4351338"/>
-        </p:xfrm>
-        <a:graphic>
-          <a:graphicData uri="http://schemas.openxmlformats.org/drawingml/2006/chart">
-            <c:chart xmlns:c="http://schemas.openxmlformats.org/drawingml/2006/chart" xmlns:r="http://schemas.openxmlformats.org/officeDocument/2006/relationships" r:id="rId2"/>
-          </a:graphicData>
-        </a:graphic>
-      </p:graphicFrame>
       <p:sp>
         <p:nvSpPr>
           <p:cNvPr id="5" name="TextBox 4"/>
@@ -12493,6 +13598,30 @@
           </a:p>
         </p:txBody>
       </p:sp>
+      <p:graphicFrame>
+        <p:nvGraphicFramePr>
+          <p:cNvPr id="6" name="Chart 5"/>
+          <p:cNvGraphicFramePr>
+            <a:graphicFrameLocks/>
+          </p:cNvGraphicFramePr>
+          <p:nvPr>
+            <p:extLst>
+              <p:ext uri="{D42A27DB-BD31-4B8C-83A1-F6EECF244321}">
+                <p14:modId xmlns:p14="http://schemas.microsoft.com/office/powerpoint/2010/main" val="1307557956"/>
+              </p:ext>
+            </p:extLst>
+          </p:nvPr>
+        </p:nvGraphicFramePr>
+        <p:xfrm>
+          <a:off x="628650" y="1304099"/>
+          <a:ext cx="7675113" cy="4626851"/>
+        </p:xfrm>
+        <a:graphic>
+          <a:graphicData uri="http://schemas.openxmlformats.org/drawingml/2006/chart">
+            <c:chart xmlns:c="http://schemas.openxmlformats.org/drawingml/2006/chart" xmlns:r="http://schemas.openxmlformats.org/officeDocument/2006/relationships" r:id="rId2"/>
+          </a:graphicData>
+        </a:graphic>
+      </p:graphicFrame>
     </p:spTree>
     <p:extLst>
       <p:ext uri="{BB962C8B-B14F-4D97-AF65-F5344CB8AC3E}">
@@ -12505,14 +13634,10 @@
   </p:clrMapOvr>
   <mc:AlternateContent xmlns:mc="http://schemas.openxmlformats.org/markup-compatibility/2006" xmlns:p14="http://schemas.microsoft.com/office/powerpoint/2010/main">
     <mc:Choice Requires="p14">
-      <p:transition spd="med" p14:dur="700">
-        <p:fade/>
-      </p:transition>
+      <p:transition p14:dur="0"/>
     </mc:Choice>
     <mc:Fallback xmlns="">
-      <p:transition spd="med">
-        <p:fade/>
-      </p:transition>
+      <p:transition/>
     </mc:Fallback>
   </mc:AlternateContent>
   <p:timing>
@@ -13101,14 +14226,10 @@
   </p:clrMapOvr>
   <mc:AlternateContent xmlns:mc="http://schemas.openxmlformats.org/markup-compatibility/2006" xmlns:p14="http://schemas.microsoft.com/office/powerpoint/2010/main">
     <mc:Choice Requires="p14">
-      <p:transition spd="med" p14:dur="700">
-        <p:fade/>
-      </p:transition>
+      <p:transition p14:dur="0"/>
     </mc:Choice>
     <mc:Fallback xmlns="">
-      <p:transition spd="med">
-        <p:fade/>
-      </p:transition>
+      <p:transition/>
     </mc:Fallback>
   </mc:AlternateContent>
   <p:timing>
@@ -13269,14 +14390,14 @@
       </p:graphicFrame>
       <p:sp>
         <p:nvSpPr>
-          <p:cNvPr id="12" name="TextBox 11"/>
+          <p:cNvPr id="5" name="TextBox 4"/>
           <p:cNvSpPr txBox="1"/>
           <p:nvPr/>
         </p:nvSpPr>
         <p:spPr>
           <a:xfrm>
-            <a:off x="0" y="6019216"/>
-            <a:ext cx="9143999" cy="646331"/>
+            <a:off x="1" y="6199093"/>
+            <a:ext cx="9143999" cy="369332"/>
           </a:xfrm>
           <a:prstGeom prst="rect">
             <a:avLst/>
@@ -13296,14 +14417,7 @@
             <a:pPr algn="ctr"/>
             <a:r>
               <a:rPr lang="en-SG" i="1" dirty="0" smtClean="0"/>
-              <a:t>Changing size of particles while keeping fill fraction constant</a:t>
-            </a:r>
-          </a:p>
-          <a:p>
-            <a:pPr algn="ctr"/>
-            <a:r>
-              <a:rPr lang="en-SG" i="1" dirty="0" smtClean="0"/>
-              <a:t>Inconclusive: More runs needed</a:t>
+              <a:t>Weak effect of changing size of particles while keeping fill fraction constant</a:t>
             </a:r>
           </a:p>
         </p:txBody>
@@ -13320,14 +14434,10 @@
   </p:clrMapOvr>
   <mc:AlternateContent xmlns:mc="http://schemas.openxmlformats.org/markup-compatibility/2006" xmlns:p14="http://schemas.microsoft.com/office/powerpoint/2010/main">
     <mc:Choice Requires="p14">
-      <p:transition spd="med" p14:dur="700">
-        <p:fade/>
-      </p:transition>
+      <p:transition p14:dur="0"/>
     </mc:Choice>
     <mc:Fallback xmlns="">
-      <p:transition spd="med">
-        <p:fade/>
-      </p:transition>
+      <p:transition/>
     </mc:Fallback>
   </mc:AlternateContent>
   <p:timing>
@@ -13367,7 +14477,7 @@
                                           </p:stCondLst>
                                         </p:cTn>
                                         <p:tgtEl>
-                                          <p:spTgt spid="12"/>
+                                          <p:spTgt spid="5"/>
                                         </p:tgtEl>
                                         <p:attrNameLst>
                                           <p:attrName>style.visibility</p:attrName>
@@ -13381,7 +14491,7 @@
                                       <p:cBhvr>
                                         <p:cTn id="7" dur="500"/>
                                         <p:tgtEl>
-                                          <p:spTgt spid="12"/>
+                                          <p:spTgt spid="5"/>
                                         </p:tgtEl>
                                       </p:cBhvr>
                                     </p:animEffect>
@@ -13416,7 +14526,7 @@
       </p:par>
     </p:tnLst>
     <p:bldLst>
-      <p:bldP spid="12" grpId="0" animBg="1"/>
+      <p:bldP spid="5" grpId="0" animBg="1"/>
     </p:bldLst>
   </p:timing>
 </p:sld>
@@ -13462,22 +14572,61 @@
           </a:p>
         </p:txBody>
       </p:sp>
+      <p:graphicFrame>
+        <p:nvGraphicFramePr>
+          <p:cNvPr id="4" name="Chart 3"/>
+          <p:cNvGraphicFramePr>
+            <a:graphicFrameLocks/>
+          </p:cNvGraphicFramePr>
+          <p:nvPr>
+            <p:extLst>
+              <p:ext uri="{D42A27DB-BD31-4B8C-83A1-F6EECF244321}">
+                <p14:modId xmlns:p14="http://schemas.microsoft.com/office/powerpoint/2010/main" val="447864581"/>
+              </p:ext>
+            </p:extLst>
+          </p:nvPr>
+        </p:nvGraphicFramePr>
+        <p:xfrm>
+          <a:off x="453732" y="1385046"/>
+          <a:ext cx="8061618" cy="4814047"/>
+        </p:xfrm>
+        <a:graphic>
+          <a:graphicData uri="http://schemas.openxmlformats.org/drawingml/2006/chart">
+            <c:chart xmlns:c="http://schemas.openxmlformats.org/drawingml/2006/chart" xmlns:r="http://schemas.openxmlformats.org/officeDocument/2006/relationships" r:id="rId2"/>
+          </a:graphicData>
+        </a:graphic>
+      </p:graphicFrame>
       <p:sp>
         <p:nvSpPr>
-          <p:cNvPr id="3" name="Content Placeholder 2"/>
-          <p:cNvSpPr>
-            <a:spLocks noGrp="1"/>
-          </p:cNvSpPr>
-          <p:nvPr>
-            <p:ph idx="1"/>
-          </p:nvPr>
+          <p:cNvPr id="5" name="TextBox 4"/>
+          <p:cNvSpPr txBox="1"/>
+          <p:nvPr/>
         </p:nvSpPr>
-        <p:spPr/>
+        <p:spPr>
+          <a:xfrm>
+            <a:off x="1" y="6199093"/>
+            <a:ext cx="9143999" cy="369332"/>
+          </a:xfrm>
+          <a:prstGeom prst="rect">
+            <a:avLst/>
+          </a:prstGeom>
+          <a:solidFill>
+            <a:schemeClr val="accent3">
+              <a:alpha val="30000"/>
+            </a:schemeClr>
+          </a:solidFill>
+        </p:spPr>
         <p:txBody>
-          <a:bodyPr/>
+          <a:bodyPr wrap="square" rtlCol="0">
+            <a:spAutoFit/>
+          </a:bodyPr>
           <a:lstStyle/>
           <a:p>
-            <a:endParaRPr lang="en-SG" dirty="0"/>
+            <a:pPr algn="ctr"/>
+            <a:r>
+              <a:rPr lang="en-SG" i="1" dirty="0" smtClean="0"/>
+              <a:t>Weak effect of having a mixture of particle sizes</a:t>
+            </a:r>
           </a:p>
         </p:txBody>
       </p:sp>
@@ -13493,22 +14642,100 @@
   </p:clrMapOvr>
   <mc:AlternateContent xmlns:mc="http://schemas.openxmlformats.org/markup-compatibility/2006" xmlns:p14="http://schemas.microsoft.com/office/powerpoint/2010/main">
     <mc:Choice Requires="p14">
-      <p:transition spd="med" p14:dur="700">
-        <p:fade/>
-      </p:transition>
+      <p:transition p14:dur="0"/>
     </mc:Choice>
     <mc:Fallback xmlns="">
-      <p:transition spd="med">
-        <p:fade/>
-      </p:transition>
+      <p:transition/>
     </mc:Fallback>
   </mc:AlternateContent>
   <p:timing>
     <p:tnLst>
       <p:par>
-        <p:cTn id="1" dur="indefinite" restart="never" nodeType="tmRoot"/>
+        <p:cTn id="1" dur="indefinite" restart="never" nodeType="tmRoot">
+          <p:childTnLst>
+            <p:seq concurrent="1" nextAc="seek">
+              <p:cTn id="2" dur="indefinite" nodeType="mainSeq">
+                <p:childTnLst>
+                  <p:par>
+                    <p:cTn id="3" fill="hold">
+                      <p:stCondLst>
+                        <p:cond delay="indefinite"/>
+                        <p:cond evt="onBegin" delay="0">
+                          <p:tn val="2"/>
+                        </p:cond>
+                      </p:stCondLst>
+                      <p:childTnLst>
+                        <p:par>
+                          <p:cTn id="4" fill="hold">
+                            <p:stCondLst>
+                              <p:cond delay="0"/>
+                            </p:stCondLst>
+                            <p:childTnLst>
+                              <p:par>
+                                <p:cTn id="5" presetID="22" presetClass="entr" presetSubtype="8" fill="hold" grpId="0" nodeType="withEffect">
+                                  <p:stCondLst>
+                                    <p:cond delay="0"/>
+                                  </p:stCondLst>
+                                  <p:childTnLst>
+                                    <p:set>
+                                      <p:cBhvr>
+                                        <p:cTn id="6" dur="1" fill="hold">
+                                          <p:stCondLst>
+                                            <p:cond delay="0"/>
+                                          </p:stCondLst>
+                                        </p:cTn>
+                                        <p:tgtEl>
+                                          <p:spTgt spid="5"/>
+                                        </p:tgtEl>
+                                        <p:attrNameLst>
+                                          <p:attrName>style.visibility</p:attrName>
+                                        </p:attrNameLst>
+                                      </p:cBhvr>
+                                      <p:to>
+                                        <p:strVal val="visible"/>
+                                      </p:to>
+                                    </p:set>
+                                    <p:animEffect transition="in" filter="wipe(left)">
+                                      <p:cBhvr>
+                                        <p:cTn id="7" dur="500"/>
+                                        <p:tgtEl>
+                                          <p:spTgt spid="5"/>
+                                        </p:tgtEl>
+                                      </p:cBhvr>
+                                    </p:animEffect>
+                                  </p:childTnLst>
+                                </p:cTn>
+                              </p:par>
+                            </p:childTnLst>
+                          </p:cTn>
+                        </p:par>
+                      </p:childTnLst>
+                    </p:cTn>
+                  </p:par>
+                </p:childTnLst>
+              </p:cTn>
+              <p:prevCondLst>
+                <p:cond evt="onPrev" delay="0">
+                  <p:tgtEl>
+                    <p:sldTgt/>
+                  </p:tgtEl>
+                </p:cond>
+              </p:prevCondLst>
+              <p:nextCondLst>
+                <p:cond evt="onNext" delay="0">
+                  <p:tgtEl>
+                    <p:sldTgt/>
+                  </p:tgtEl>
+                </p:cond>
+              </p:nextCondLst>
+            </p:seq>
+          </p:childTnLst>
+        </p:cTn>
       </p:par>
     </p:tnLst>
+    <p:bldLst>
+      <p:bldP spid="5" grpId="0" animBg="1"/>
+    </p:bldLst>
   </p:timing>
 </p:sld>
 </file>
@@ -13584,14 +14811,10 @@
   </p:clrMapOvr>
   <mc:AlternateContent xmlns:mc="http://schemas.openxmlformats.org/markup-compatibility/2006" xmlns:p14="http://schemas.microsoft.com/office/powerpoint/2010/main">
     <mc:Choice Requires="p14">
-      <p:transition spd="med" p14:dur="700">
-        <p:fade/>
-      </p:transition>
+      <p:transition p14:dur="0"/>
     </mc:Choice>
     <mc:Fallback xmlns="">
-      <p:transition spd="med">
-        <p:fade/>
-      </p:transition>
+      <p:transition/>
     </mc:Fallback>
   </mc:AlternateContent>
   <p:timing>
@@ -14170,14 +15393,10 @@
   </p:clrMapOvr>
   <mc:AlternateContent xmlns:mc="http://schemas.openxmlformats.org/markup-compatibility/2006" xmlns:p14="http://schemas.microsoft.com/office/powerpoint/2010/main">
     <mc:Choice Requires="p14">
-      <p:transition spd="med" p14:dur="700">
-        <p:fade/>
-      </p:transition>
+      <p:transition p14:dur="0"/>
     </mc:Choice>
     <mc:Fallback xmlns="">
-      <p:transition spd="med">
-        <p:fade/>
-      </p:transition>
+      <p:transition/>
     </mc:Fallback>
   </mc:AlternateContent>
   <p:timing>
@@ -14266,14 +15485,10 @@
   </p:clrMapOvr>
   <mc:AlternateContent xmlns:mc="http://schemas.openxmlformats.org/markup-compatibility/2006" xmlns:p14="http://schemas.microsoft.com/office/powerpoint/2010/main">
     <mc:Choice Requires="p14">
-      <p:transition spd="med" p14:dur="700">
-        <p:fade/>
-      </p:transition>
+      <p:transition p14:dur="0"/>
     </mc:Choice>
     <mc:Fallback xmlns="">
-      <p:transition spd="med">
-        <p:fade/>
-      </p:transition>
+      <p:transition/>
     </mc:Fallback>
   </mc:AlternateContent>
   <p:timing>
@@ -14359,24 +15574,14 @@
           <a:p>
             <a:r>
               <a:rPr lang="en-SG" i="1" dirty="0" smtClean="0"/>
-              <a:t>Fill Fraction: </a:t>
+              <a:t>Fill Fraction: 0.41</a:t>
             </a:r>
-            <a:r>
-              <a:rPr lang="en-SG" i="1" dirty="0" smtClean="0"/>
-              <a:t>0.41</a:t>
-            </a:r>
-            <a:endParaRPr lang="en-SG" i="1" dirty="0" smtClean="0"/>
           </a:p>
           <a:p>
             <a:r>
               <a:rPr lang="en-SG" i="1" dirty="0" smtClean="0"/>
-              <a:t>Coordination Number: </a:t>
+              <a:t>Coordination Number: 2.3</a:t>
             </a:r>
-            <a:r>
-              <a:rPr lang="en-SG" i="1" dirty="0" smtClean="0"/>
-              <a:t>2.3</a:t>
-            </a:r>
-            <a:endParaRPr lang="en-SG" i="1" dirty="0" smtClean="0"/>
           </a:p>
         </p:txBody>
       </p:sp>
@@ -14497,11 +15702,7 @@
           <a:p>
             <a:r>
               <a:rPr lang="en-SG" i="1" dirty="0" smtClean="0"/>
-              <a:t>Fill </a:t>
-            </a:r>
-            <a:r>
-              <a:rPr lang="en-SG" i="1" dirty="0" smtClean="0"/>
-              <a:t>Fraction: 0.52</a:t>
+              <a:t>Fill Fraction: 0.52</a:t>
             </a:r>
           </a:p>
           <a:p>
@@ -14509,7 +15710,6 @@
               <a:rPr lang="en-SG" i="1" dirty="0" smtClean="0"/>
               <a:t>Coordination Number: 4.1</a:t>
             </a:r>
-            <a:endParaRPr lang="en-SG" i="1" dirty="0" smtClean="0"/>
           </a:p>
         </p:txBody>
       </p:sp>
@@ -14564,14 +15764,10 @@
   </p:clrMapOvr>
   <mc:AlternateContent xmlns:mc="http://schemas.openxmlformats.org/markup-compatibility/2006" xmlns:p14="http://schemas.microsoft.com/office/powerpoint/2010/main">
     <mc:Choice Requires="p14">
-      <p:transition spd="med" p14:dur="700">
-        <p:fade/>
-      </p:transition>
+      <p:transition p14:dur="0"/>
     </mc:Choice>
     <mc:Fallback xmlns="">
-      <p:transition spd="med">
-        <p:fade/>
-      </p:transition>
+      <p:transition/>
     </mc:Fallback>
   </mc:AlternateContent>
   <p:timing>
@@ -15250,14 +16446,10 @@
   </p:clrMapOvr>
   <mc:AlternateContent xmlns:mc="http://schemas.openxmlformats.org/markup-compatibility/2006" xmlns:p14="http://schemas.microsoft.com/office/powerpoint/2010/main">
     <mc:Choice Requires="p14">
-      <p:transition spd="med" p14:dur="700">
-        <p:fade/>
-      </p:transition>
+      <p:transition p14:dur="0"/>
     </mc:Choice>
     <mc:Fallback xmlns="">
-      <p:transition spd="med">
-        <p:fade/>
-      </p:transition>
+      <p:transition/>
     </mc:Fallback>
   </mc:AlternateContent>
   <p:timing>
@@ -15360,14 +16552,10 @@
   </p:clrMapOvr>
   <mc:AlternateContent xmlns:mc="http://schemas.openxmlformats.org/markup-compatibility/2006" xmlns:p14="http://schemas.microsoft.com/office/powerpoint/2010/main">
     <mc:Choice Requires="p14">
-      <p:transition spd="med" p14:dur="700">
-        <p:fade/>
-      </p:transition>
+      <p:transition p14:dur="0"/>
     </mc:Choice>
     <mc:Fallback xmlns="">
-      <p:transition spd="med">
-        <p:fade/>
-      </p:transition>
+      <p:transition/>
     </mc:Fallback>
   </mc:AlternateContent>
   <p:timing>
@@ -19385,14 +20573,10 @@
   </p:clrMapOvr>
   <mc:AlternateContent xmlns:mc="http://schemas.openxmlformats.org/markup-compatibility/2006" xmlns:p14="http://schemas.microsoft.com/office/powerpoint/2010/main">
     <mc:Choice Requires="p14">
-      <p:transition spd="med" p14:dur="700">
-        <p:fade/>
-      </p:transition>
+      <p:transition p14:dur="0"/>
     </mc:Choice>
     <mc:Fallback xmlns="">
-      <p:transition spd="med">
-        <p:fade/>
-      </p:transition>
+      <p:transition/>
     </mc:Fallback>
   </mc:AlternateContent>
   <p:timing>
@@ -19512,14 +20696,10 @@
   </p:clrMapOvr>
   <mc:AlternateContent xmlns:mc="http://schemas.openxmlformats.org/markup-compatibility/2006" xmlns:p14="http://schemas.microsoft.com/office/powerpoint/2010/main">
     <mc:Choice Requires="p14">
-      <p:transition spd="med" p14:dur="700">
-        <p:fade/>
-      </p:transition>
+      <p:transition p14:dur="0"/>
     </mc:Choice>
     <mc:Fallback xmlns="">
-      <p:transition spd="med">
-        <p:fade/>
-      </p:transition>
+      <p:transition/>
     </mc:Fallback>
   </mc:AlternateContent>
   <p:timing>
@@ -21116,14 +22296,10 @@
   </p:clrMapOvr>
   <mc:AlternateContent xmlns:mc="http://schemas.openxmlformats.org/markup-compatibility/2006" xmlns:p14="http://schemas.microsoft.com/office/powerpoint/2010/main">
     <mc:Choice Requires="p14">
-      <p:transition spd="med" p14:dur="700">
-        <p:fade/>
-      </p:transition>
+      <p:transition p14:dur="0"/>
     </mc:Choice>
     <mc:Fallback xmlns="">
-      <p:transition spd="med">
-        <p:fade/>
-      </p:transition>
+      <p:transition/>
     </mc:Fallback>
   </mc:AlternateContent>
   <p:timing>
@@ -22055,14 +23231,10 @@
   </p:clrMapOvr>
   <mc:AlternateContent xmlns:mc="http://schemas.openxmlformats.org/markup-compatibility/2006" xmlns:p14="http://schemas.microsoft.com/office/powerpoint/2010/main">
     <mc:Choice Requires="p14">
-      <p:transition spd="med" p14:dur="700">
-        <p:fade/>
-      </p:transition>
+      <p:transition p14:dur="0"/>
     </mc:Choice>
     <mc:Fallback xmlns="">
-      <p:transition spd="med">
-        <p:fade/>
-      </p:transition>
+      <p:transition/>
     </mc:Fallback>
   </mc:AlternateContent>
   <p:timing>
@@ -23213,14 +24385,10 @@
   </p:clrMapOvr>
   <mc:AlternateContent xmlns:mc="http://schemas.openxmlformats.org/markup-compatibility/2006" xmlns:p14="http://schemas.microsoft.com/office/powerpoint/2010/main">
     <mc:Choice Requires="p14">
-      <p:transition spd="med" p14:dur="700">
-        <p:fade/>
-      </p:transition>
+      <p:transition p14:dur="0"/>
     </mc:Choice>
     <mc:Fallback xmlns="">
-      <p:transition spd="med">
-        <p:fade/>
-      </p:transition>
+      <p:transition/>
     </mc:Fallback>
   </mc:AlternateContent>
   <p:timing>
@@ -23535,14 +24703,10 @@
   </p:clrMapOvr>
   <mc:AlternateContent xmlns:mc="http://schemas.openxmlformats.org/markup-compatibility/2006" xmlns:p14="http://schemas.microsoft.com/office/powerpoint/2010/main">
     <mc:Choice Requires="p14">
-      <p:transition spd="med" p14:dur="700">
-        <p:fade/>
-      </p:transition>
+      <p:transition p14:dur="0"/>
     </mc:Choice>
     <mc:Fallback xmlns="">
-      <p:transition spd="med">
-        <p:fade/>
-      </p:transition>
+      <p:transition/>
     </mc:Fallback>
   </mc:AlternateContent>
   <p:timing>
@@ -23788,14 +24952,10 @@
   </p:clrMapOvr>
   <mc:AlternateContent xmlns:mc="http://schemas.openxmlformats.org/markup-compatibility/2006" xmlns:p14="http://schemas.microsoft.com/office/powerpoint/2010/main">
     <mc:Choice Requires="p14">
-      <p:transition spd="med" p14:dur="700">
-        <p:fade/>
-      </p:transition>
+      <p:transition p14:dur="0"/>
     </mc:Choice>
     <mc:Fallback xmlns="">
-      <p:transition spd="med">
-        <p:fade/>
-      </p:transition>
+      <p:transition/>
     </mc:Fallback>
   </mc:AlternateContent>
   <p:timing>

</xml_diff>